<commit_message>
304 & 455 final code, final exam review, 330 metal detector final proj
</commit_message>
<xml_diff>
--- a/SI/Exam 1 Review Session.pptx
+++ b/SI/Exam 1 Review Session.pptx
@@ -107,7 +107,16 @@
       </a:defRPr>
     </a:lvl9pPr>
   </p:defaultTextStyle>
+  <p:extLst>
+    <p:ext uri="{EFAFB233-063F-42B5-8137-9DF3F51BA10A}">
+      <p15:sldGuideLst xmlns:p15="http://schemas.microsoft.com/office/powerpoint/2012/main"/>
+    </p:ext>
+  </p:extLst>
 </p:presentation>
+</file>
+
+<file path=ppt/revisionInfo.xml><?xml version="1.0" encoding="utf-8"?>
+<p1510:revInfo xmlns:a="http://schemas.openxmlformats.org/drawingml/2006/main" xmlns:r="http://schemas.openxmlformats.org/officeDocument/2006/relationships" xmlns:p1510="http://schemas.microsoft.com/office/powerpoint/2015/10/main"/>
 </file>
 
 <file path=ppt/slideLayouts/slideLayout1.xml><?xml version="1.0" encoding="utf-8"?>
@@ -257,7 +266,7 @@
           <a:p>
             <a:fld id="{019AF69D-025D-4225-B3F5-0DE48247D21C}" type="datetimeFigureOut">
               <a:rPr lang="en-US" smtClean="0"/>
-              <a:t>11/28/2017</a:t>
+              <a:t>11/30/2017</a:t>
             </a:fld>
             <a:endParaRPr lang="en-US"/>
           </a:p>
@@ -455,7 +464,7 @@
           <a:p>
             <a:fld id="{019AF69D-025D-4225-B3F5-0DE48247D21C}" type="datetimeFigureOut">
               <a:rPr lang="en-US" smtClean="0"/>
-              <a:t>11/28/2017</a:t>
+              <a:t>11/30/2017</a:t>
             </a:fld>
             <a:endParaRPr lang="en-US"/>
           </a:p>
@@ -663,7 +672,7 @@
           <a:p>
             <a:fld id="{019AF69D-025D-4225-B3F5-0DE48247D21C}" type="datetimeFigureOut">
               <a:rPr lang="en-US" smtClean="0"/>
-              <a:t>11/28/2017</a:t>
+              <a:t>11/30/2017</a:t>
             </a:fld>
             <a:endParaRPr lang="en-US"/>
           </a:p>
@@ -861,7 +870,7 @@
           <a:p>
             <a:fld id="{019AF69D-025D-4225-B3F5-0DE48247D21C}" type="datetimeFigureOut">
               <a:rPr lang="en-US" smtClean="0"/>
-              <a:t>11/28/2017</a:t>
+              <a:t>11/30/2017</a:t>
             </a:fld>
             <a:endParaRPr lang="en-US"/>
           </a:p>
@@ -1136,7 +1145,7 @@
           <a:p>
             <a:fld id="{019AF69D-025D-4225-B3F5-0DE48247D21C}" type="datetimeFigureOut">
               <a:rPr lang="en-US" smtClean="0"/>
-              <a:t>11/28/2017</a:t>
+              <a:t>11/30/2017</a:t>
             </a:fld>
             <a:endParaRPr lang="en-US"/>
           </a:p>
@@ -1401,7 +1410,7 @@
           <a:p>
             <a:fld id="{019AF69D-025D-4225-B3F5-0DE48247D21C}" type="datetimeFigureOut">
               <a:rPr lang="en-US" smtClean="0"/>
-              <a:t>11/28/2017</a:t>
+              <a:t>11/30/2017</a:t>
             </a:fld>
             <a:endParaRPr lang="en-US"/>
           </a:p>
@@ -1813,7 +1822,7 @@
           <a:p>
             <a:fld id="{019AF69D-025D-4225-B3F5-0DE48247D21C}" type="datetimeFigureOut">
               <a:rPr lang="en-US" smtClean="0"/>
-              <a:t>11/28/2017</a:t>
+              <a:t>11/30/2017</a:t>
             </a:fld>
             <a:endParaRPr lang="en-US"/>
           </a:p>
@@ -1954,7 +1963,7 @@
           <a:p>
             <a:fld id="{019AF69D-025D-4225-B3F5-0DE48247D21C}" type="datetimeFigureOut">
               <a:rPr lang="en-US" smtClean="0"/>
-              <a:t>11/28/2017</a:t>
+              <a:t>11/30/2017</a:t>
             </a:fld>
             <a:endParaRPr lang="en-US"/>
           </a:p>
@@ -2067,7 +2076,7 @@
           <a:p>
             <a:fld id="{019AF69D-025D-4225-B3F5-0DE48247D21C}" type="datetimeFigureOut">
               <a:rPr lang="en-US" smtClean="0"/>
-              <a:t>11/28/2017</a:t>
+              <a:t>11/30/2017</a:t>
             </a:fld>
             <a:endParaRPr lang="en-US"/>
           </a:p>
@@ -2378,7 +2387,7 @@
           <a:p>
             <a:fld id="{019AF69D-025D-4225-B3F5-0DE48247D21C}" type="datetimeFigureOut">
               <a:rPr lang="en-US" smtClean="0"/>
-              <a:t>11/28/2017</a:t>
+              <a:t>11/30/2017</a:t>
             </a:fld>
             <a:endParaRPr lang="en-US"/>
           </a:p>
@@ -2666,7 +2675,7 @@
           <a:p>
             <a:fld id="{019AF69D-025D-4225-B3F5-0DE48247D21C}" type="datetimeFigureOut">
               <a:rPr lang="en-US" smtClean="0"/>
-              <a:t>11/28/2017</a:t>
+              <a:t>11/30/2017</a:t>
             </a:fld>
             <a:endParaRPr lang="en-US"/>
           </a:p>
@@ -2907,7 +2916,7 @@
           <a:p>
             <a:fld id="{019AF69D-025D-4225-B3F5-0DE48247D21C}" type="datetimeFigureOut">
               <a:rPr lang="en-US" smtClean="0"/>
-              <a:t>11/28/2017</a:t>
+              <a:t>11/30/2017</a:t>
             </a:fld>
             <a:endParaRPr lang="en-US"/>
           </a:p>
@@ -3642,6 +3651,64 @@
           </a:prstGeom>
         </p:spPr>
       </p:pic>
+      <p:sp>
+        <p:nvSpPr>
+          <p:cNvPr id="4" name="TextBox 3">
+            <a:extLst>
+              <a:ext uri="{FF2B5EF4-FFF2-40B4-BE49-F238E27FC236}">
+                <a16:creationId xmlns:a16="http://schemas.microsoft.com/office/drawing/2014/main" id="{778AE6CB-9FA0-4EAC-BC69-D40C09F9E0C6}"/>
+              </a:ext>
+            </a:extLst>
+          </p:cNvPr>
+          <p:cNvSpPr txBox="1"/>
+          <p:nvPr/>
+        </p:nvSpPr>
+        <p:spPr>
+          <a:xfrm>
+            <a:off x="4074695" y="1825625"/>
+            <a:ext cx="6849979" cy="1569660"/>
+          </a:xfrm>
+          <a:prstGeom prst="rect">
+            <a:avLst/>
+          </a:prstGeom>
+          <a:noFill/>
+        </p:spPr>
+        <p:txBody>
+          <a:bodyPr wrap="square" rtlCol="0">
+            <a:spAutoFit/>
+          </a:bodyPr>
+          <a:lstStyle/>
+          <a:p>
+            <a:r>
+              <a:rPr lang="en-US" sz="3200" dirty="0"/>
+              <a:t>Useful when working with distributed charges</a:t>
+            </a:r>
+          </a:p>
+          <a:p>
+            <a:r>
+              <a:rPr lang="el-GR" sz="3200" i="1" dirty="0"/>
+              <a:t>ε</a:t>
+            </a:r>
+            <a:r>
+              <a:rPr lang="el-GR" sz="3200" baseline="-25000" dirty="0"/>
+              <a:t>0</a:t>
+            </a:r>
+            <a:r>
+              <a:rPr lang="el-GR" sz="3200" dirty="0"/>
+              <a:t> = 8.854×10</a:t>
+            </a:r>
+            <a:r>
+              <a:rPr lang="el-GR" sz="3200" baseline="30000" dirty="0"/>
+              <a:t>−12</a:t>
+            </a:r>
+            <a:r>
+              <a:rPr lang="el-GR" sz="3200"/>
+              <a:t> </a:t>
+            </a:r>
+            <a:endParaRPr lang="en-US" sz="3200" dirty="0"/>
+          </a:p>
+        </p:txBody>
+      </p:sp>
     </p:spTree>
     <p:extLst>
       <p:ext uri="{BB962C8B-B14F-4D97-AF65-F5344CB8AC3E}">

</xml_diff>